<commit_message>
update project struct ppt
</commit_message>
<xml_diff>
--- a/document/PPT/架構及規劃.pptx
+++ b/document/PPT/架構及規劃.pptx
@@ -5,13 +5,18 @@
     <p:sldMasterId id="2147483648" r:id="rId1"/>
   </p:sldMasterIdLst>
   <p:notesMasterIdLst>
-    <p:notesMasterId r:id="rId6"/>
+    <p:notesMasterId r:id="rId11"/>
   </p:notesMasterIdLst>
   <p:sldIdLst>
     <p:sldId id="256" r:id="rId2"/>
     <p:sldId id="257" r:id="rId3"/>
     <p:sldId id="258" r:id="rId4"/>
     <p:sldId id="259" r:id="rId5"/>
+    <p:sldId id="260" r:id="rId6"/>
+    <p:sldId id="261" r:id="rId7"/>
+    <p:sldId id="264" r:id="rId8"/>
+    <p:sldId id="265" r:id="rId9"/>
+    <p:sldId id="266" r:id="rId10"/>
   </p:sldIdLst>
   <p:sldSz cx="12192000" cy="6858000"/>
   <p:notesSz cx="6858000" cy="9144000"/>
@@ -110,6 +115,11 @@
       </a:defRPr>
     </a:lvl9pPr>
   </p:defaultTextStyle>
+  <p:extLst>
+    <p:ext uri="{EFAFB233-063F-42B5-8137-9DF3F51BA10A}">
+      <p15:sldGuideLst xmlns:p15="http://schemas.microsoft.com/office/powerpoint/2012/main"/>
+    </p:ext>
+  </p:extLst>
 </p:presentation>
 </file>
 
@@ -6255,25 +6265,25 @@
           <a:lstStyle/>
           <a:p>
             <a:r>
-              <a:rPr kumimoji="1" lang="zh-TW" altLang="en-US" sz="2400" dirty="0" smtClean="0"/>
+              <a:rPr kumimoji="1" lang="zh-TW" altLang="en-US" sz="3600" dirty="0" smtClean="0"/>
               <a:t>能夠將流程以自動方式測試並驗證，同時於</a:t>
             </a:r>
             <a:r>
-              <a:rPr kumimoji="1" lang="en-US" altLang="zh-TW" sz="2400" dirty="0" smtClean="0"/>
+              <a:rPr kumimoji="1" lang="en-US" altLang="zh-TW" sz="3600" dirty="0" smtClean="0"/>
               <a:t>CR</a:t>
             </a:r>
             <a:r>
-              <a:rPr kumimoji="1" lang="zh-TW" altLang="en-US" sz="2400" dirty="0" smtClean="0"/>
+              <a:rPr kumimoji="1" lang="zh-TW" altLang="en-US" sz="3600" dirty="0" smtClean="0"/>
               <a:t>時可以驗證所修改內容。</a:t>
             </a:r>
-            <a:endParaRPr kumimoji="1" lang="en-US" altLang="zh-TW" sz="2400" dirty="0" smtClean="0"/>
-          </a:p>
-          <a:p>
-            <a:r>
-              <a:rPr kumimoji="1" lang="zh-TW" altLang="en-US" sz="2400" dirty="0" smtClean="0"/>
+            <a:endParaRPr kumimoji="1" lang="en-US" altLang="zh-TW" sz="3600" dirty="0" smtClean="0"/>
+          </a:p>
+          <a:p>
+            <a:r>
+              <a:rPr kumimoji="1" lang="zh-TW" altLang="en-US" sz="3600" dirty="0" smtClean="0"/>
               <a:t>開發時能夠快速抵達至某頁進行除錯。</a:t>
             </a:r>
-            <a:endParaRPr kumimoji="1" lang="en-US" altLang="zh-TW" sz="2400" dirty="0" smtClean="0"/>
+            <a:endParaRPr kumimoji="1" lang="en-US" altLang="zh-TW" sz="3600" dirty="0" smtClean="0"/>
           </a:p>
         </p:txBody>
       </p:sp>
@@ -6345,7 +6355,12 @@
             <p:ph idx="1"/>
           </p:nvPr>
         </p:nvSpPr>
-        <p:spPr/>
+        <p:spPr>
+          <a:xfrm>
+            <a:off x="685800" y="1238425"/>
+            <a:ext cx="10131425" cy="3649133"/>
+          </a:xfrm>
+        </p:spPr>
         <p:txBody>
           <a:bodyPr>
             <a:normAutofit/>
@@ -6426,35 +6441,566 @@
             <p:ph type="title"/>
           </p:nvPr>
         </p:nvSpPr>
-        <p:spPr/>
+        <p:spPr>
+          <a:xfrm>
+            <a:off x="675290" y="147145"/>
+            <a:ext cx="10131425" cy="1456267"/>
+          </a:xfrm>
+        </p:spPr>
         <p:txBody>
           <a:bodyPr/>
           <a:lstStyle/>
           <a:p>
             <a:r>
               <a:rPr kumimoji="1" lang="zh-TW" altLang="en-US" dirty="0" smtClean="0"/>
-              <a:t>運作模式</a:t>
+              <a:t>操作流程</a:t>
             </a:r>
             <a:endParaRPr kumimoji="1" lang="zh-TW" altLang="en-US" dirty="0"/>
           </a:p>
         </p:txBody>
       </p:sp>
-      <p:sp>
-        <p:nvSpPr>
-          <p:cNvPr id="3" name="內容版面配置區 2"/>
-          <p:cNvSpPr>
-            <a:spLocks noGrp="1"/>
-          </p:cNvSpPr>
-          <p:nvPr>
-            <p:ph idx="1"/>
-          </p:nvPr>
-        </p:nvSpPr>
-        <p:spPr/>
-        <p:txBody>
-          <a:bodyPr/>
-          <a:lstStyle/>
-          <a:p>
+      <p:grpSp>
+        <p:nvGrpSpPr>
+          <p:cNvPr id="35" name="群組 34"/>
+          <p:cNvGrpSpPr/>
+          <p:nvPr/>
+        </p:nvGrpSpPr>
+        <p:grpSpPr>
+          <a:xfrm>
+            <a:off x="5922498" y="1559739"/>
+            <a:ext cx="5278112" cy="4952474"/>
+            <a:chOff x="5528603" y="1280160"/>
+            <a:chExt cx="5278112" cy="4952474"/>
+          </a:xfrm>
+        </p:grpSpPr>
+        <p:sp>
+          <p:nvSpPr>
+            <p:cNvPr id="4" name="矩形 3"/>
+            <p:cNvSpPr/>
+            <p:nvPr/>
+          </p:nvSpPr>
+          <p:spPr>
+            <a:xfrm>
+              <a:off x="5528603" y="1280160"/>
+              <a:ext cx="5278112" cy="4952474"/>
+            </a:xfrm>
+            <a:prstGeom prst="rect">
+              <a:avLst/>
+            </a:prstGeom>
+            <a:solidFill>
+              <a:schemeClr val="bg2">
+                <a:lumMod val="20000"/>
+                <a:lumOff val="80000"/>
+              </a:schemeClr>
+            </a:solidFill>
+            <a:ln>
+              <a:solidFill>
+                <a:schemeClr val="tx1"/>
+              </a:solidFill>
+            </a:ln>
+          </p:spPr>
+          <p:style>
+            <a:lnRef idx="2">
+              <a:schemeClr val="accent1">
+                <a:shade val="50000"/>
+              </a:schemeClr>
+            </a:lnRef>
+            <a:fillRef idx="1">
+              <a:schemeClr val="accent1"/>
+            </a:fillRef>
+            <a:effectRef idx="0">
+              <a:schemeClr val="accent1"/>
+            </a:effectRef>
+            <a:fontRef idx="minor">
+              <a:schemeClr val="lt1"/>
+            </a:fontRef>
+          </p:style>
+          <p:txBody>
+            <a:bodyPr rtlCol="0" anchor="ctr"/>
+            <a:lstStyle/>
+            <a:p>
+              <a:pPr algn="ctr"/>
+              <a:endParaRPr kumimoji="1" lang="zh-TW" altLang="en-US"/>
+            </a:p>
+          </p:txBody>
+        </p:sp>
+        <p:grpSp>
+          <p:nvGrpSpPr>
+            <p:cNvPr id="7" name="群組 6"/>
+            <p:cNvGrpSpPr/>
+            <p:nvPr/>
+          </p:nvGrpSpPr>
+          <p:grpSpPr>
+            <a:xfrm>
+              <a:off x="7659444" y="4776821"/>
+              <a:ext cx="2127827" cy="1040524"/>
+              <a:chOff x="7977352" y="4876800"/>
+              <a:chExt cx="2127827" cy="1040524"/>
+            </a:xfrm>
+          </p:grpSpPr>
+          <p:sp>
+            <p:nvSpPr>
+              <p:cNvPr id="5" name="矩形 4"/>
+              <p:cNvSpPr/>
+              <p:nvPr/>
+            </p:nvSpPr>
+            <p:spPr>
+              <a:xfrm>
+                <a:off x="7977352" y="4876800"/>
+                <a:ext cx="1944413" cy="1040524"/>
+              </a:xfrm>
+              <a:prstGeom prst="rect">
+                <a:avLst/>
+              </a:prstGeom>
+            </p:spPr>
+            <p:style>
+              <a:lnRef idx="2">
+                <a:schemeClr val="accent1">
+                  <a:shade val="50000"/>
+                </a:schemeClr>
+              </a:lnRef>
+              <a:fillRef idx="1">
+                <a:schemeClr val="accent1"/>
+              </a:fillRef>
+              <a:effectRef idx="0">
+                <a:schemeClr val="accent1"/>
+              </a:effectRef>
+              <a:fontRef idx="minor">
+                <a:schemeClr val="lt1"/>
+              </a:fontRef>
+            </p:style>
+            <p:txBody>
+              <a:bodyPr rtlCol="0" anchor="ctr"/>
+              <a:lstStyle/>
+              <a:p>
+                <a:pPr algn="ctr"/>
+                <a:endParaRPr kumimoji="1" lang="zh-TW" altLang="en-US"/>
+              </a:p>
+            </p:txBody>
+          </p:sp>
+          <p:sp>
+            <p:nvSpPr>
+              <p:cNvPr id="6" name="文字方塊 5"/>
+              <p:cNvSpPr txBox="1"/>
+              <p:nvPr/>
+            </p:nvSpPr>
+            <p:spPr>
+              <a:xfrm>
+                <a:off x="8318582" y="4959129"/>
+                <a:ext cx="1786597" cy="954107"/>
+              </a:xfrm>
+              <a:prstGeom prst="rect">
+                <a:avLst/>
+              </a:prstGeom>
+              <a:noFill/>
+            </p:spPr>
+            <p:txBody>
+              <a:bodyPr wrap="square" rtlCol="0">
+                <a:spAutoFit/>
+              </a:bodyPr>
+              <a:lstStyle/>
+              <a:p>
+                <a:r>
+                  <a:rPr kumimoji="1" lang="en-US" altLang="zh-TW" sz="2800" dirty="0" smtClean="0"/>
+                  <a:t>XSELL</a:t>
+                </a:r>
+                <a:br>
+                  <a:rPr kumimoji="1" lang="en-US" altLang="zh-TW" sz="2800" dirty="0" smtClean="0"/>
+                </a:br>
+                <a:r>
+                  <a:rPr kumimoji="1" lang="en-US" altLang="zh-TW" sz="2800" dirty="0" smtClean="0"/>
+                  <a:t>	AP</a:t>
+                </a:r>
+                <a:endParaRPr kumimoji="1" lang="zh-TW" altLang="en-US" sz="2800" dirty="0"/>
+              </a:p>
+            </p:txBody>
+          </p:sp>
+        </p:grpSp>
+        <p:grpSp>
+          <p:nvGrpSpPr>
+            <p:cNvPr id="11" name="群組 10"/>
+            <p:cNvGrpSpPr/>
+            <p:nvPr/>
+          </p:nvGrpSpPr>
+          <p:grpSpPr>
+            <a:xfrm>
+              <a:off x="6222496" y="2103570"/>
+              <a:ext cx="4192172" cy="2240851"/>
+              <a:chOff x="6344529" y="2217485"/>
+              <a:chExt cx="4192172" cy="2240851"/>
+            </a:xfrm>
+          </p:grpSpPr>
+          <p:sp>
+            <p:nvSpPr>
+              <p:cNvPr id="8" name="矩形 7"/>
+              <p:cNvSpPr/>
+              <p:nvPr/>
+            </p:nvSpPr>
+            <p:spPr>
+              <a:xfrm>
+                <a:off x="6344529" y="2221573"/>
+                <a:ext cx="4192172" cy="2236763"/>
+              </a:xfrm>
+              <a:prstGeom prst="rect">
+                <a:avLst/>
+              </a:prstGeom>
+              <a:solidFill>
+                <a:schemeClr val="accent1">
+                  <a:lumMod val="40000"/>
+                  <a:lumOff val="60000"/>
+                </a:schemeClr>
+              </a:solidFill>
+            </p:spPr>
+            <p:style>
+              <a:lnRef idx="2">
+                <a:schemeClr val="accent1">
+                  <a:shade val="50000"/>
+                </a:schemeClr>
+              </a:lnRef>
+              <a:fillRef idx="1">
+                <a:schemeClr val="accent1"/>
+              </a:fillRef>
+              <a:effectRef idx="0">
+                <a:schemeClr val="accent1"/>
+              </a:effectRef>
+              <a:fontRef idx="minor">
+                <a:schemeClr val="lt1"/>
+              </a:fontRef>
+            </p:style>
+            <p:txBody>
+              <a:bodyPr rtlCol="0" anchor="ctr"/>
+              <a:lstStyle/>
+              <a:p>
+                <a:pPr algn="ctr"/>
+                <a:endParaRPr kumimoji="1" lang="zh-TW" altLang="en-US" dirty="0"/>
+              </a:p>
+            </p:txBody>
+          </p:sp>
+          <p:sp>
+            <p:nvSpPr>
+              <p:cNvPr id="10" name="文字方塊 9"/>
+              <p:cNvSpPr txBox="1"/>
+              <p:nvPr/>
+            </p:nvSpPr>
+            <p:spPr>
+              <a:xfrm>
+                <a:off x="8440615" y="2217485"/>
+                <a:ext cx="1856936" cy="646331"/>
+              </a:xfrm>
+              <a:prstGeom prst="rect">
+                <a:avLst/>
+              </a:prstGeom>
+              <a:noFill/>
+            </p:spPr>
+            <p:txBody>
+              <a:bodyPr wrap="square" rtlCol="0">
+                <a:spAutoFit/>
+              </a:bodyPr>
+              <a:lstStyle/>
+              <a:p>
+                <a:r>
+                  <a:rPr kumimoji="1" lang="en-US" altLang="zh-TW" sz="3600" dirty="0" smtClean="0"/>
+                  <a:t>Browser</a:t>
+                </a:r>
+                <a:endParaRPr kumimoji="1" lang="zh-TW" altLang="en-US" sz="3600" dirty="0"/>
+              </a:p>
+            </p:txBody>
+          </p:sp>
+        </p:grpSp>
+        <p:sp>
+          <p:nvSpPr>
+            <p:cNvPr id="9" name="矩形 8"/>
+            <p:cNvSpPr/>
+            <p:nvPr/>
+          </p:nvSpPr>
+          <p:spPr>
+            <a:xfrm>
+              <a:off x="6416450" y="2832230"/>
+              <a:ext cx="2533108" cy="1302245"/>
+            </a:xfrm>
+            <a:prstGeom prst="rect">
+              <a:avLst/>
+            </a:prstGeom>
+            <a:solidFill>
+              <a:schemeClr val="accent1"/>
+            </a:solidFill>
+          </p:spPr>
+          <p:style>
+            <a:lnRef idx="2">
+              <a:schemeClr val="accent1">
+                <a:shade val="50000"/>
+              </a:schemeClr>
+            </a:lnRef>
+            <a:fillRef idx="1">
+              <a:schemeClr val="accent1"/>
+            </a:fillRef>
+            <a:effectRef idx="0">
+              <a:schemeClr val="accent1"/>
+            </a:effectRef>
+            <a:fontRef idx="minor">
+              <a:schemeClr val="lt1"/>
+            </a:fontRef>
+          </p:style>
+          <p:txBody>
+            <a:bodyPr rtlCol="0" anchor="ctr"/>
+            <a:lstStyle/>
+            <a:p>
+              <a:pPr algn="ctr"/>
+              <a:r>
+                <a:rPr kumimoji="1" lang="en-US" altLang="zh-TW" sz="3200" dirty="0" smtClean="0"/>
+                <a:t>E2E AP</a:t>
+              </a:r>
+              <a:endParaRPr kumimoji="1" lang="zh-TW" altLang="en-US" sz="3200" dirty="0"/>
+            </a:p>
+          </p:txBody>
+        </p:sp>
+        <p:cxnSp>
+          <p:nvCxnSpPr>
+            <p:cNvPr id="20" name="曲線接點 19"/>
+            <p:cNvCxnSpPr/>
+            <p:nvPr/>
+          </p:nvCxnSpPr>
+          <p:spPr>
+            <a:xfrm>
+              <a:off x="6474308" y="4417230"/>
+              <a:ext cx="1019445" cy="1017451"/>
+            </a:xfrm>
+            <a:prstGeom prst="curvedConnector3">
+              <a:avLst>
+                <a:gd name="adj1" fmla="val -1058"/>
+              </a:avLst>
+            </a:prstGeom>
+            <a:ln w="28575">
+              <a:solidFill>
+                <a:srgbClr val="FF0000"/>
+              </a:solidFill>
+              <a:tailEnd type="triangle"/>
+            </a:ln>
+          </p:spPr>
+          <p:style>
+            <a:lnRef idx="1">
+              <a:schemeClr val="accent1"/>
+            </a:lnRef>
+            <a:fillRef idx="0">
+              <a:schemeClr val="accent1"/>
+            </a:fillRef>
+            <a:effectRef idx="0">
+              <a:schemeClr val="accent1"/>
+            </a:effectRef>
+            <a:fontRef idx="minor">
+              <a:schemeClr val="tx1"/>
+            </a:fontRef>
+          </p:style>
+        </p:cxnSp>
+      </p:grpSp>
+      <p:sp>
+        <p:nvSpPr>
+          <p:cNvPr id="28" name="矩形 27"/>
+          <p:cNvSpPr/>
+          <p:nvPr/>
+        </p:nvSpPr>
+        <p:spPr>
+          <a:xfrm>
+            <a:off x="3555062" y="3210306"/>
+            <a:ext cx="1596219" cy="1105249"/>
+          </a:xfrm>
+          <a:prstGeom prst="rect">
+            <a:avLst/>
+          </a:prstGeom>
+          <a:solidFill>
+            <a:schemeClr val="accent4">
+              <a:lumMod val="60000"/>
+              <a:lumOff val="40000"/>
+            </a:schemeClr>
+          </a:solidFill>
+        </p:spPr>
+        <p:style>
+          <a:lnRef idx="2">
+            <a:schemeClr val="accent1">
+              <a:shade val="50000"/>
+            </a:schemeClr>
+          </a:lnRef>
+          <a:fillRef idx="1">
+            <a:schemeClr val="accent1"/>
+          </a:fillRef>
+          <a:effectRef idx="0">
+            <a:schemeClr val="accent1"/>
+          </a:effectRef>
+          <a:fontRef idx="minor">
+            <a:schemeClr val="lt1"/>
+          </a:fontRef>
+        </p:style>
+        <p:txBody>
+          <a:bodyPr rtlCol="0" anchor="ctr"/>
+          <a:lstStyle/>
+          <a:p>
+            <a:pPr algn="ctr"/>
+            <a:r>
+              <a:rPr kumimoji="1" lang="en-US" altLang="zh-TW" sz="2800" dirty="0" smtClean="0"/>
+              <a:t>Testing Report</a:t>
+            </a:r>
+            <a:endParaRPr kumimoji="1" lang="zh-TW" altLang="en-US" sz="2800" dirty="0"/>
+          </a:p>
+        </p:txBody>
+      </p:sp>
+      <p:cxnSp>
+        <p:nvCxnSpPr>
+          <p:cNvPr id="30" name="直線箭頭接點 29"/>
+          <p:cNvCxnSpPr>
+            <a:stCxn id="9" idx="1"/>
+            <a:endCxn id="28" idx="3"/>
+          </p:cNvCxnSpPr>
+          <p:nvPr/>
+        </p:nvCxnSpPr>
+        <p:spPr>
+          <a:xfrm flipH="1" flipV="1">
+            <a:off x="5151281" y="3762931"/>
+            <a:ext cx="1659064" cy="1"/>
+          </a:xfrm>
+          <a:prstGeom prst="straightConnector1">
+            <a:avLst/>
+          </a:prstGeom>
+          <a:ln w="60325">
+            <a:solidFill>
+              <a:srgbClr val="FF0000"/>
+            </a:solidFill>
+            <a:tailEnd type="triangle"/>
+          </a:ln>
+        </p:spPr>
+        <p:style>
+          <a:lnRef idx="1">
+            <a:schemeClr val="accent1"/>
+          </a:lnRef>
+          <a:fillRef idx="0">
+            <a:schemeClr val="accent1"/>
+          </a:fillRef>
+          <a:effectRef idx="0">
+            <a:schemeClr val="accent1"/>
+          </a:effectRef>
+          <a:fontRef idx="minor">
+            <a:schemeClr val="tx1"/>
+          </a:fontRef>
+        </p:style>
+      </p:cxnSp>
+      <p:sp>
+        <p:nvSpPr>
+          <p:cNvPr id="34" name="矩形 33"/>
+          <p:cNvSpPr/>
+          <p:nvPr/>
+        </p:nvSpPr>
+        <p:spPr>
+          <a:xfrm>
+            <a:off x="2377440" y="1702191"/>
+            <a:ext cx="2053883" cy="1047710"/>
+          </a:xfrm>
+          <a:prstGeom prst="rect">
+            <a:avLst/>
+          </a:prstGeom>
+          <a:solidFill>
+            <a:schemeClr val="bg2">
+              <a:lumMod val="20000"/>
+              <a:lumOff val="80000"/>
+            </a:schemeClr>
+          </a:solidFill>
+        </p:spPr>
+        <p:style>
+          <a:lnRef idx="2">
+            <a:schemeClr val="accent1">
+              <a:shade val="50000"/>
+            </a:schemeClr>
+          </a:lnRef>
+          <a:fillRef idx="1">
+            <a:schemeClr val="accent1"/>
+          </a:fillRef>
+          <a:effectRef idx="0">
+            <a:schemeClr val="accent1"/>
+          </a:effectRef>
+          <a:fontRef idx="minor">
+            <a:schemeClr val="lt1"/>
+          </a:fontRef>
+        </p:style>
+        <p:txBody>
+          <a:bodyPr rtlCol="0" anchor="ctr"/>
+          <a:lstStyle/>
+          <a:p>
+            <a:pPr algn="ctr"/>
+            <a:r>
+              <a:rPr kumimoji="1" lang="en-US" altLang="zh-TW" sz="3600" dirty="0" smtClean="0"/>
+              <a:t>Tester</a:t>
+            </a:r>
             <a:endParaRPr kumimoji="1" lang="zh-TW" altLang="en-US" dirty="0"/>
+          </a:p>
+        </p:txBody>
+      </p:sp>
+      <p:cxnSp>
+        <p:nvCxnSpPr>
+          <p:cNvPr id="41" name="直線箭頭接點 40"/>
+          <p:cNvCxnSpPr>
+            <a:stCxn id="34" idx="3"/>
+          </p:cNvCxnSpPr>
+          <p:nvPr/>
+        </p:nvCxnSpPr>
+        <p:spPr>
+          <a:xfrm>
+            <a:off x="4431323" y="2226046"/>
+            <a:ext cx="2379022" cy="1136132"/>
+          </a:xfrm>
+          <a:prstGeom prst="straightConnector1">
+            <a:avLst/>
+          </a:prstGeom>
+          <a:ln w="53975">
+            <a:solidFill>
+              <a:srgbClr val="FF0000"/>
+            </a:solidFill>
+            <a:tailEnd type="triangle"/>
+          </a:ln>
+        </p:spPr>
+        <p:style>
+          <a:lnRef idx="1">
+            <a:schemeClr val="accent1"/>
+          </a:lnRef>
+          <a:fillRef idx="0">
+            <a:schemeClr val="accent1"/>
+          </a:fillRef>
+          <a:effectRef idx="0">
+            <a:schemeClr val="accent1"/>
+          </a:effectRef>
+          <a:fontRef idx="minor">
+            <a:schemeClr val="tx1"/>
+          </a:fontRef>
+        </p:style>
+      </p:cxnSp>
+      <p:sp>
+        <p:nvSpPr>
+          <p:cNvPr id="42" name="文字方塊 41"/>
+          <p:cNvSpPr txBox="1"/>
+          <p:nvPr/>
+        </p:nvSpPr>
+        <p:spPr>
+          <a:xfrm>
+            <a:off x="7473632" y="1676221"/>
+            <a:ext cx="2244589" cy="461665"/>
+          </a:xfrm>
+          <a:prstGeom prst="rect">
+            <a:avLst/>
+          </a:prstGeom>
+          <a:noFill/>
+        </p:spPr>
+        <p:txBody>
+          <a:bodyPr wrap="none" rtlCol="0">
+            <a:spAutoFit/>
+          </a:bodyPr>
+          <a:lstStyle/>
+          <a:p>
+            <a:r>
+              <a:rPr kumimoji="1" lang="en-US" altLang="zh-TW" sz="2400" b="1" dirty="0" smtClean="0"/>
+              <a:t>Remote </a:t>
+            </a:r>
+            <a:r>
+              <a:rPr kumimoji="1" lang="en-US" altLang="zh-TW" sz="2400" b="1" smtClean="0"/>
+              <a:t>or Local</a:t>
+            </a:r>
+            <a:endParaRPr kumimoji="1" lang="zh-TW" altLang="en-US" sz="2400" b="1" dirty="0"/>
           </a:p>
         </p:txBody>
       </p:sp>
@@ -6462,6 +7008,825 @@
     <p:extLst>
       <p:ext uri="{BB962C8B-B14F-4D97-AF65-F5344CB8AC3E}">
         <p14:creationId xmlns:p14="http://schemas.microsoft.com/office/powerpoint/2010/main" val="575979459"/>
+      </p:ext>
+    </p:extLst>
+  </p:cSld>
+  <p:clrMapOvr>
+    <a:masterClrMapping/>
+  </p:clrMapOvr>
+  <p:timing>
+    <p:tnLst>
+      <p:par>
+        <p:cTn id="1" dur="indefinite" restart="never" nodeType="tmRoot"/>
+      </p:par>
+    </p:tnLst>
+  </p:timing>
+</p:sld>
+</file>
+
+<file path=ppt/slides/slide5.xml><?xml version="1.0" encoding="utf-8"?>
+<p:sld xmlns:a="http://schemas.openxmlformats.org/drawingml/2006/main" xmlns:r="http://schemas.openxmlformats.org/officeDocument/2006/relationships" xmlns:p="http://schemas.openxmlformats.org/presentationml/2006/main">
+  <p:cSld>
+    <p:spTree>
+      <p:nvGrpSpPr>
+        <p:cNvPr id="1" name=""/>
+        <p:cNvGrpSpPr/>
+        <p:nvPr/>
+      </p:nvGrpSpPr>
+      <p:grpSpPr>
+        <a:xfrm>
+          <a:off x="0" y="0"/>
+          <a:ext cx="0" cy="0"/>
+          <a:chOff x="0" y="0"/>
+          <a:chExt cx="0" cy="0"/>
+        </a:xfrm>
+      </p:grpSpPr>
+      <p:sp>
+        <p:nvSpPr>
+          <p:cNvPr id="2" name="標題 1"/>
+          <p:cNvSpPr>
+            <a:spLocks noGrp="1"/>
+          </p:cNvSpPr>
+          <p:nvPr>
+            <p:ph type="title"/>
+          </p:nvPr>
+        </p:nvSpPr>
+        <p:spPr>
+          <a:xfrm>
+            <a:off x="675290" y="147145"/>
+            <a:ext cx="10131425" cy="1456267"/>
+          </a:xfrm>
+        </p:spPr>
+        <p:txBody>
+          <a:bodyPr/>
+          <a:lstStyle/>
+          <a:p>
+            <a:r>
+              <a:rPr kumimoji="1" lang="zh-TW" altLang="en-US" dirty="0" smtClean="0"/>
+              <a:t>系統架構</a:t>
+            </a:r>
+            <a:endParaRPr kumimoji="1" lang="zh-TW" altLang="en-US" dirty="0"/>
+          </a:p>
+        </p:txBody>
+      </p:sp>
+      <p:grpSp>
+        <p:nvGrpSpPr>
+          <p:cNvPr id="17" name="群組 16"/>
+          <p:cNvGrpSpPr/>
+          <p:nvPr/>
+        </p:nvGrpSpPr>
+        <p:grpSpPr>
+          <a:xfrm>
+            <a:off x="2204670" y="1430615"/>
+            <a:ext cx="7938137" cy="4731035"/>
+            <a:chOff x="2598565" y="1050787"/>
+            <a:chExt cx="7938137" cy="4731035"/>
+          </a:xfrm>
+        </p:grpSpPr>
+        <p:sp>
+          <p:nvSpPr>
+            <p:cNvPr id="28" name="矩形 27"/>
+            <p:cNvSpPr/>
+            <p:nvPr/>
+          </p:nvSpPr>
+          <p:spPr>
+            <a:xfrm>
+              <a:off x="2598565" y="1050787"/>
+              <a:ext cx="7938137" cy="4731035"/>
+            </a:xfrm>
+            <a:prstGeom prst="rect">
+              <a:avLst/>
+            </a:prstGeom>
+            <a:solidFill>
+              <a:schemeClr val="accent4">
+                <a:lumMod val="60000"/>
+                <a:lumOff val="40000"/>
+              </a:schemeClr>
+            </a:solidFill>
+          </p:spPr>
+          <p:style>
+            <a:lnRef idx="2">
+              <a:schemeClr val="accent1">
+                <a:shade val="50000"/>
+              </a:schemeClr>
+            </a:lnRef>
+            <a:fillRef idx="1">
+              <a:schemeClr val="accent1"/>
+            </a:fillRef>
+            <a:effectRef idx="0">
+              <a:schemeClr val="accent1"/>
+            </a:effectRef>
+            <a:fontRef idx="minor">
+              <a:schemeClr val="lt1"/>
+            </a:fontRef>
+          </p:style>
+          <p:txBody>
+            <a:bodyPr rtlCol="0" anchor="ctr"/>
+            <a:lstStyle/>
+            <a:p>
+              <a:pPr algn="ctr"/>
+              <a:endParaRPr kumimoji="1" lang="zh-TW" altLang="en-US" sz="2800" dirty="0"/>
+            </a:p>
+          </p:txBody>
+        </p:sp>
+        <p:sp>
+          <p:nvSpPr>
+            <p:cNvPr id="34" name="矩形 33"/>
+            <p:cNvSpPr/>
+            <p:nvPr/>
+          </p:nvSpPr>
+          <p:spPr>
+            <a:xfrm>
+              <a:off x="4896940" y="1603412"/>
+              <a:ext cx="2053883" cy="1047710"/>
+            </a:xfrm>
+            <a:prstGeom prst="rect">
+              <a:avLst/>
+            </a:prstGeom>
+            <a:solidFill>
+              <a:schemeClr val="accent1">
+                <a:lumMod val="60000"/>
+                <a:lumOff val="40000"/>
+              </a:schemeClr>
+            </a:solidFill>
+          </p:spPr>
+          <p:style>
+            <a:lnRef idx="2">
+              <a:schemeClr val="accent1">
+                <a:shade val="50000"/>
+              </a:schemeClr>
+            </a:lnRef>
+            <a:fillRef idx="1">
+              <a:schemeClr val="accent1"/>
+            </a:fillRef>
+            <a:effectRef idx="0">
+              <a:schemeClr val="accent1"/>
+            </a:effectRef>
+            <a:fontRef idx="minor">
+              <a:schemeClr val="lt1"/>
+            </a:fontRef>
+          </p:style>
+          <p:txBody>
+            <a:bodyPr rtlCol="0" anchor="ctr"/>
+            <a:lstStyle/>
+            <a:p>
+              <a:pPr algn="ctr"/>
+              <a:r>
+                <a:rPr kumimoji="1" lang="en-US" altLang="zh-TW" sz="3200" dirty="0" smtClean="0"/>
+                <a:t>CORE</a:t>
+              </a:r>
+              <a:endParaRPr kumimoji="1" lang="zh-TW" altLang="en-US" sz="3200" dirty="0"/>
+            </a:p>
+          </p:txBody>
+        </p:sp>
+        <p:cxnSp>
+          <p:nvCxnSpPr>
+            <p:cNvPr id="41" name="直線箭頭接點 40"/>
+            <p:cNvCxnSpPr>
+              <a:stCxn id="19" idx="1"/>
+              <a:endCxn id="34" idx="3"/>
+            </p:cNvCxnSpPr>
+            <p:nvPr/>
+          </p:nvCxnSpPr>
+          <p:spPr>
+            <a:xfrm flipH="1">
+              <a:off x="6950823" y="2127267"/>
+              <a:ext cx="1003899" cy="0"/>
+            </a:xfrm>
+            <a:prstGeom prst="straightConnector1">
+              <a:avLst/>
+            </a:prstGeom>
+            <a:ln w="53975">
+              <a:solidFill>
+                <a:schemeClr val="accent6">
+                  <a:lumMod val="50000"/>
+                </a:schemeClr>
+              </a:solidFill>
+              <a:tailEnd type="triangle"/>
+            </a:ln>
+          </p:spPr>
+          <p:style>
+            <a:lnRef idx="1">
+              <a:schemeClr val="accent1"/>
+            </a:lnRef>
+            <a:fillRef idx="0">
+              <a:schemeClr val="accent1"/>
+            </a:fillRef>
+            <a:effectRef idx="0">
+              <a:schemeClr val="accent1"/>
+            </a:effectRef>
+            <a:fontRef idx="minor">
+              <a:schemeClr val="tx1"/>
+            </a:fontRef>
+          </p:style>
+        </p:cxnSp>
+        <p:sp>
+          <p:nvSpPr>
+            <p:cNvPr id="19" name="矩形 18"/>
+            <p:cNvSpPr/>
+            <p:nvPr/>
+          </p:nvSpPr>
+          <p:spPr>
+            <a:xfrm>
+              <a:off x="7954722" y="1603412"/>
+              <a:ext cx="2053883" cy="1047710"/>
+            </a:xfrm>
+            <a:prstGeom prst="rect">
+              <a:avLst/>
+            </a:prstGeom>
+            <a:solidFill>
+              <a:schemeClr val="bg2">
+                <a:lumMod val="20000"/>
+                <a:lumOff val="80000"/>
+              </a:schemeClr>
+            </a:solidFill>
+          </p:spPr>
+          <p:style>
+            <a:lnRef idx="2">
+              <a:schemeClr val="accent1">
+                <a:shade val="50000"/>
+              </a:schemeClr>
+            </a:lnRef>
+            <a:fillRef idx="1">
+              <a:schemeClr val="accent1"/>
+            </a:fillRef>
+            <a:effectRef idx="0">
+              <a:schemeClr val="accent1"/>
+            </a:effectRef>
+            <a:fontRef idx="minor">
+              <a:schemeClr val="lt1"/>
+            </a:fontRef>
+          </p:style>
+          <p:txBody>
+            <a:bodyPr rtlCol="0" anchor="ctr"/>
+            <a:lstStyle/>
+            <a:p>
+              <a:pPr algn="ctr"/>
+              <a:r>
+                <a:rPr kumimoji="1" lang="en-US" altLang="zh-TW" sz="3200" dirty="0" smtClean="0"/>
+                <a:t>Data</a:t>
+              </a:r>
+              <a:endParaRPr kumimoji="1" lang="zh-TW" altLang="en-US" sz="3200" dirty="0"/>
+            </a:p>
+          </p:txBody>
+        </p:sp>
+        <p:sp>
+          <p:nvSpPr>
+            <p:cNvPr id="21" name="矩形 20"/>
+            <p:cNvSpPr/>
+            <p:nvPr/>
+          </p:nvSpPr>
+          <p:spPr>
+            <a:xfrm>
+              <a:off x="3396675" y="3311003"/>
+              <a:ext cx="2053883" cy="1047710"/>
+            </a:xfrm>
+            <a:prstGeom prst="rect">
+              <a:avLst/>
+            </a:prstGeom>
+            <a:solidFill>
+              <a:schemeClr val="bg2">
+                <a:lumMod val="20000"/>
+                <a:lumOff val="80000"/>
+              </a:schemeClr>
+            </a:solidFill>
+          </p:spPr>
+          <p:style>
+            <a:lnRef idx="2">
+              <a:schemeClr val="accent1">
+                <a:shade val="50000"/>
+              </a:schemeClr>
+            </a:lnRef>
+            <a:fillRef idx="1">
+              <a:schemeClr val="accent1"/>
+            </a:fillRef>
+            <a:effectRef idx="0">
+              <a:schemeClr val="accent1"/>
+            </a:effectRef>
+            <a:fontRef idx="minor">
+              <a:schemeClr val="lt1"/>
+            </a:fontRef>
+          </p:style>
+          <p:txBody>
+            <a:bodyPr rtlCol="0" anchor="ctr"/>
+            <a:lstStyle/>
+            <a:p>
+              <a:pPr algn="ctr"/>
+              <a:r>
+                <a:rPr kumimoji="1" lang="en-US" altLang="zh-TW" sz="3200" dirty="0" smtClean="0"/>
+                <a:t>Puppeteer</a:t>
+              </a:r>
+              <a:endParaRPr kumimoji="1" lang="zh-TW" altLang="en-US" sz="3200" dirty="0"/>
+            </a:p>
+          </p:txBody>
+        </p:sp>
+        <p:sp>
+          <p:nvSpPr>
+            <p:cNvPr id="22" name="矩形 21"/>
+            <p:cNvSpPr/>
+            <p:nvPr/>
+          </p:nvSpPr>
+          <p:spPr>
+            <a:xfrm>
+              <a:off x="6373810" y="3294713"/>
+              <a:ext cx="2053883" cy="1047710"/>
+            </a:xfrm>
+            <a:prstGeom prst="rect">
+              <a:avLst/>
+            </a:prstGeom>
+            <a:solidFill>
+              <a:schemeClr val="bg2">
+                <a:lumMod val="20000"/>
+                <a:lumOff val="80000"/>
+              </a:schemeClr>
+            </a:solidFill>
+          </p:spPr>
+          <p:style>
+            <a:lnRef idx="2">
+              <a:schemeClr val="accent1">
+                <a:shade val="50000"/>
+              </a:schemeClr>
+            </a:lnRef>
+            <a:fillRef idx="1">
+              <a:schemeClr val="accent1"/>
+            </a:fillRef>
+            <a:effectRef idx="0">
+              <a:schemeClr val="accent1"/>
+            </a:effectRef>
+            <a:fontRef idx="minor">
+              <a:schemeClr val="lt1"/>
+            </a:fontRef>
+          </p:style>
+          <p:txBody>
+            <a:bodyPr rtlCol="0" anchor="ctr"/>
+            <a:lstStyle/>
+            <a:p>
+              <a:pPr algn="ctr"/>
+              <a:r>
+                <a:rPr kumimoji="1" lang="en-US" altLang="zh-TW" sz="3200" dirty="0"/>
+                <a:t>Selenium</a:t>
+              </a:r>
+              <a:endParaRPr kumimoji="1" lang="zh-TW" altLang="en-US" sz="3200" dirty="0"/>
+            </a:p>
+          </p:txBody>
+        </p:sp>
+      </p:grpSp>
+      <p:sp>
+        <p:nvSpPr>
+          <p:cNvPr id="18" name="文字方塊 17"/>
+          <p:cNvSpPr txBox="1"/>
+          <p:nvPr/>
+        </p:nvSpPr>
+        <p:spPr>
+          <a:xfrm>
+            <a:off x="4374060" y="5243365"/>
+            <a:ext cx="4933017" cy="523220"/>
+          </a:xfrm>
+          <a:prstGeom prst="rect">
+            <a:avLst/>
+          </a:prstGeom>
+          <a:noFill/>
+        </p:spPr>
+        <p:txBody>
+          <a:bodyPr wrap="none" rtlCol="0">
+            <a:spAutoFit/>
+          </a:bodyPr>
+          <a:lstStyle/>
+          <a:p>
+            <a:r>
+              <a:rPr kumimoji="1" lang="en-US" altLang="zh-TW" sz="2800" dirty="0" err="1" smtClean="0"/>
+              <a:t>SpringBoot</a:t>
+            </a:r>
+            <a:r>
+              <a:rPr kumimoji="1" lang="en-US" altLang="zh-TW" sz="2800" dirty="0" smtClean="0"/>
+              <a:t> + Maven + Hibernate</a:t>
+            </a:r>
+            <a:endParaRPr kumimoji="1" lang="zh-TW" altLang="en-US" sz="2800" dirty="0"/>
+          </a:p>
+        </p:txBody>
+      </p:sp>
+    </p:spTree>
+    <p:extLst>
+      <p:ext uri="{BB962C8B-B14F-4D97-AF65-F5344CB8AC3E}">
+        <p14:creationId xmlns:p14="http://schemas.microsoft.com/office/powerpoint/2010/main" val="732421053"/>
+      </p:ext>
+    </p:extLst>
+  </p:cSld>
+  <p:clrMapOvr>
+    <a:masterClrMapping/>
+  </p:clrMapOvr>
+  <p:timing>
+    <p:tnLst>
+      <p:par>
+        <p:cTn id="1" dur="indefinite" restart="never" nodeType="tmRoot"/>
+      </p:par>
+    </p:tnLst>
+  </p:timing>
+</p:sld>
+</file>
+
+<file path=ppt/slides/slide6.xml><?xml version="1.0" encoding="utf-8"?>
+<p:sld xmlns:a="http://schemas.openxmlformats.org/drawingml/2006/main" xmlns:r="http://schemas.openxmlformats.org/officeDocument/2006/relationships" xmlns:p="http://schemas.openxmlformats.org/presentationml/2006/main">
+  <p:cSld>
+    <p:spTree>
+      <p:nvGrpSpPr>
+        <p:cNvPr id="1" name=""/>
+        <p:cNvGrpSpPr/>
+        <p:nvPr/>
+      </p:nvGrpSpPr>
+      <p:grpSpPr>
+        <a:xfrm>
+          <a:off x="0" y="0"/>
+          <a:ext cx="0" cy="0"/>
+          <a:chOff x="0" y="0"/>
+          <a:chExt cx="0" cy="0"/>
+        </a:xfrm>
+      </p:grpSpPr>
+      <p:sp>
+        <p:nvSpPr>
+          <p:cNvPr id="2" name="標題 1"/>
+          <p:cNvSpPr>
+            <a:spLocks noGrp="1"/>
+          </p:cNvSpPr>
+          <p:nvPr>
+            <p:ph type="title"/>
+          </p:nvPr>
+        </p:nvSpPr>
+        <p:spPr>
+          <a:xfrm>
+            <a:off x="675290" y="147145"/>
+            <a:ext cx="10131425" cy="1456267"/>
+          </a:xfrm>
+        </p:spPr>
+        <p:txBody>
+          <a:bodyPr/>
+          <a:lstStyle/>
+          <a:p>
+            <a:r>
+              <a:rPr kumimoji="1" lang="zh-TW" altLang="en-US" dirty="0" smtClean="0"/>
+              <a:t>運作模式</a:t>
+            </a:r>
+            <a:endParaRPr kumimoji="1" lang="zh-TW" altLang="en-US" dirty="0"/>
+          </a:p>
+        </p:txBody>
+      </p:sp>
+      <p:pic>
+        <p:nvPicPr>
+          <p:cNvPr id="8" name="圖片 7"/>
+          <p:cNvPicPr>
+            <a:picLocks noChangeAspect="1"/>
+          </p:cNvPicPr>
+          <p:nvPr/>
+        </p:nvPicPr>
+        <p:blipFill>
+          <a:blip r:embed="rId2">
+            <a:extLst>
+              <a:ext uri="{28A0092B-C50C-407E-A947-70E740481C1C}">
+                <a14:useLocalDpi xmlns:a14="http://schemas.microsoft.com/office/drawing/2010/main" val="0"/>
+              </a:ext>
+            </a:extLst>
+          </a:blip>
+          <a:stretch>
+            <a:fillRect/>
+          </a:stretch>
+        </p:blipFill>
+        <p:spPr>
+          <a:xfrm>
+            <a:off x="2376071" y="1266092"/>
+            <a:ext cx="8090291" cy="5289257"/>
+          </a:xfrm>
+          <a:prstGeom prst="rect">
+            <a:avLst/>
+          </a:prstGeom>
+        </p:spPr>
+      </p:pic>
+    </p:spTree>
+    <p:extLst>
+      <p:ext uri="{BB962C8B-B14F-4D97-AF65-F5344CB8AC3E}">
+        <p14:creationId xmlns:p14="http://schemas.microsoft.com/office/powerpoint/2010/main" val="606650288"/>
+      </p:ext>
+    </p:extLst>
+  </p:cSld>
+  <p:clrMapOvr>
+    <a:masterClrMapping/>
+  </p:clrMapOvr>
+  <p:timing>
+    <p:tnLst>
+      <p:par>
+        <p:cTn id="1" dur="indefinite" restart="never" nodeType="tmRoot"/>
+      </p:par>
+    </p:tnLst>
+  </p:timing>
+</p:sld>
+</file>
+
+<file path=ppt/slides/slide7.xml><?xml version="1.0" encoding="utf-8"?>
+<p:sld xmlns:a="http://schemas.openxmlformats.org/drawingml/2006/main" xmlns:r="http://schemas.openxmlformats.org/officeDocument/2006/relationships" xmlns:p="http://schemas.openxmlformats.org/presentationml/2006/main">
+  <p:cSld>
+    <p:spTree>
+      <p:nvGrpSpPr>
+        <p:cNvPr id="1" name=""/>
+        <p:cNvGrpSpPr/>
+        <p:nvPr/>
+      </p:nvGrpSpPr>
+      <p:grpSpPr>
+        <a:xfrm>
+          <a:off x="0" y="0"/>
+          <a:ext cx="0" cy="0"/>
+          <a:chOff x="0" y="0"/>
+          <a:chExt cx="0" cy="0"/>
+        </a:xfrm>
+      </p:grpSpPr>
+      <p:sp>
+        <p:nvSpPr>
+          <p:cNvPr id="2" name="標題 1"/>
+          <p:cNvSpPr>
+            <a:spLocks noGrp="1"/>
+          </p:cNvSpPr>
+          <p:nvPr>
+            <p:ph type="title"/>
+          </p:nvPr>
+        </p:nvSpPr>
+        <p:spPr>
+          <a:xfrm>
+            <a:off x="446650" y="173501"/>
+            <a:ext cx="10131425" cy="1456267"/>
+          </a:xfrm>
+        </p:spPr>
+        <p:txBody>
+          <a:bodyPr/>
+          <a:lstStyle/>
+          <a:p>
+            <a:r>
+              <a:rPr kumimoji="1" lang="zh-TW" altLang="en-US"/>
+              <a:t>專案中的角色</a:t>
+            </a:r>
+          </a:p>
+        </p:txBody>
+      </p:sp>
+      <p:sp>
+        <p:nvSpPr>
+          <p:cNvPr id="3" name="內容版面配置區 2"/>
+          <p:cNvSpPr>
+            <a:spLocks noGrp="1"/>
+          </p:cNvSpPr>
+          <p:nvPr>
+            <p:ph idx="1"/>
+          </p:nvPr>
+        </p:nvSpPr>
+        <p:spPr/>
+        <p:txBody>
+          <a:bodyPr>
+            <a:normAutofit/>
+          </a:bodyPr>
+          <a:lstStyle/>
+          <a:p>
+            <a:r>
+              <a:rPr kumimoji="1" lang="en-US" altLang="zh-TW" sz="2800" dirty="0" smtClean="0"/>
+              <a:t>E2E</a:t>
+            </a:r>
+            <a:r>
+              <a:rPr kumimoji="1" lang="zh-TW" altLang="en-US" sz="2800" dirty="0" smtClean="0"/>
+              <a:t>訂定開發遵守事項，於專案開發頁面中導入。</a:t>
+            </a:r>
+            <a:r>
+              <a:rPr kumimoji="1" lang="en-US" altLang="zh-TW" sz="2800" dirty="0" smtClean="0"/>
+              <a:t> Ex: </a:t>
+            </a:r>
+            <a:r>
+              <a:rPr kumimoji="1" lang="zh-TW" altLang="en-US" sz="2800" dirty="0" smtClean="0"/>
+              <a:t>插入特定</a:t>
+            </a:r>
+            <a:r>
+              <a:rPr kumimoji="1" lang="en-US" altLang="zh-TW" sz="2800" dirty="0" smtClean="0"/>
+              <a:t>tag</a:t>
+            </a:r>
+            <a:r>
+              <a:rPr kumimoji="1" lang="zh-TW" altLang="en-US" sz="2800" dirty="0" smtClean="0"/>
+              <a:t>標籤供</a:t>
+            </a:r>
+            <a:r>
+              <a:rPr kumimoji="1" lang="en-US" altLang="zh-TW" sz="2800" dirty="0" smtClean="0"/>
+              <a:t>Test</a:t>
+            </a:r>
+            <a:r>
+              <a:rPr kumimoji="1" lang="zh-TW" altLang="en-US" sz="2800" dirty="0" smtClean="0"/>
+              <a:t>程式辨識。</a:t>
+            </a:r>
+            <a:endParaRPr kumimoji="1" lang="en-US" altLang="zh-TW" sz="2800" dirty="0"/>
+          </a:p>
+          <a:p>
+            <a:r>
+              <a:rPr kumimoji="1" lang="zh-TW" altLang="en-US" sz="2800" dirty="0" smtClean="0"/>
+              <a:t>測試人員提供測試案例，並於資料輸入頁輸入測試資料。</a:t>
+            </a:r>
+            <a:endParaRPr kumimoji="1" lang="en-US" altLang="zh-TW" sz="2800" dirty="0" smtClean="0"/>
+          </a:p>
+          <a:p>
+            <a:endParaRPr kumimoji="1" lang="en-US" altLang="zh-TW" sz="2800" dirty="0"/>
+          </a:p>
+          <a:p>
+            <a:endParaRPr kumimoji="1" lang="en-US" altLang="zh-TW" sz="2800" dirty="0" smtClean="0"/>
+          </a:p>
+        </p:txBody>
+      </p:sp>
+    </p:spTree>
+    <p:extLst>
+      <p:ext uri="{BB962C8B-B14F-4D97-AF65-F5344CB8AC3E}">
+        <p14:creationId xmlns:p14="http://schemas.microsoft.com/office/powerpoint/2010/main" val="1002890561"/>
+      </p:ext>
+    </p:extLst>
+  </p:cSld>
+  <p:clrMapOvr>
+    <a:masterClrMapping/>
+  </p:clrMapOvr>
+</p:sld>
+</file>
+
+<file path=ppt/slides/slide8.xml><?xml version="1.0" encoding="utf-8"?>
+<p:sld xmlns:a="http://schemas.openxmlformats.org/drawingml/2006/main" xmlns:r="http://schemas.openxmlformats.org/officeDocument/2006/relationships" xmlns:p="http://schemas.openxmlformats.org/presentationml/2006/main">
+  <p:cSld>
+    <p:spTree>
+      <p:nvGrpSpPr>
+        <p:cNvPr id="1" name=""/>
+        <p:cNvGrpSpPr/>
+        <p:nvPr/>
+      </p:nvGrpSpPr>
+      <p:grpSpPr>
+        <a:xfrm>
+          <a:off x="0" y="0"/>
+          <a:ext cx="0" cy="0"/>
+          <a:chOff x="0" y="0"/>
+          <a:chExt cx="0" cy="0"/>
+        </a:xfrm>
+      </p:grpSpPr>
+      <p:sp>
+        <p:nvSpPr>
+          <p:cNvPr id="2" name="標題 1"/>
+          <p:cNvSpPr>
+            <a:spLocks noGrp="1"/>
+          </p:cNvSpPr>
+          <p:nvPr>
+            <p:ph type="title"/>
+          </p:nvPr>
+        </p:nvSpPr>
+        <p:spPr>
+          <a:xfrm>
+            <a:off x="446650" y="173501"/>
+            <a:ext cx="10131425" cy="1456267"/>
+          </a:xfrm>
+        </p:spPr>
+        <p:txBody>
+          <a:bodyPr/>
+          <a:lstStyle/>
+          <a:p>
+            <a:r>
+              <a:rPr kumimoji="1" lang="zh-TW" altLang="en-US" dirty="0" smtClean="0"/>
+              <a:t>所需技能</a:t>
+            </a:r>
+            <a:endParaRPr kumimoji="1" lang="zh-TW" altLang="en-US" dirty="0"/>
+          </a:p>
+        </p:txBody>
+      </p:sp>
+      <p:sp>
+        <p:nvSpPr>
+          <p:cNvPr id="3" name="內容版面配置區 2"/>
+          <p:cNvSpPr>
+            <a:spLocks noGrp="1"/>
+          </p:cNvSpPr>
+          <p:nvPr>
+            <p:ph idx="1"/>
+          </p:nvPr>
+        </p:nvSpPr>
+        <p:spPr>
+          <a:xfrm>
+            <a:off x="657666" y="1629768"/>
+            <a:ext cx="10131425" cy="3649133"/>
+          </a:xfrm>
+        </p:spPr>
+        <p:txBody>
+          <a:bodyPr>
+            <a:normAutofit/>
+          </a:bodyPr>
+          <a:lstStyle/>
+          <a:p>
+            <a:r>
+              <a:rPr kumimoji="1" lang="zh-TW" altLang="en-US" sz="3200" dirty="0" smtClean="0"/>
+              <a:t>測試人員：依商業邏輯訂定測試案例</a:t>
+            </a:r>
+            <a:endParaRPr kumimoji="1" lang="en-US" altLang="zh-TW" sz="3200" dirty="0" smtClean="0"/>
+          </a:p>
+          <a:p>
+            <a:r>
+              <a:rPr kumimoji="1" lang="zh-TW" altLang="en-US" sz="3200" dirty="0" smtClean="0"/>
+              <a:t>開發人員：</a:t>
+            </a:r>
+            <a:r>
+              <a:rPr kumimoji="1" lang="en-US" altLang="zh-TW" sz="3200" dirty="0" smtClean="0"/>
+              <a:t>HTML </a:t>
+            </a:r>
+            <a:r>
+              <a:rPr kumimoji="1" lang="zh-TW" altLang="en-US" sz="3200" dirty="0" smtClean="0"/>
+              <a:t>相關知識</a:t>
+            </a:r>
+            <a:endParaRPr kumimoji="1" lang="en-US" altLang="zh-TW" sz="3200" dirty="0"/>
+          </a:p>
+          <a:p>
+            <a:endParaRPr kumimoji="1" lang="en-US" altLang="zh-TW" sz="3200" dirty="0" smtClean="0"/>
+          </a:p>
+        </p:txBody>
+      </p:sp>
+    </p:spTree>
+    <p:extLst>
+      <p:ext uri="{BB962C8B-B14F-4D97-AF65-F5344CB8AC3E}">
+        <p14:creationId xmlns:p14="http://schemas.microsoft.com/office/powerpoint/2010/main" val="911137255"/>
+      </p:ext>
+    </p:extLst>
+  </p:cSld>
+  <p:clrMapOvr>
+    <a:masterClrMapping/>
+  </p:clrMapOvr>
+</p:sld>
+</file>
+
+<file path=ppt/slides/slide9.xml><?xml version="1.0" encoding="utf-8"?>
+<p:sld xmlns:a="http://schemas.openxmlformats.org/drawingml/2006/main" xmlns:r="http://schemas.openxmlformats.org/officeDocument/2006/relationships" xmlns:p="http://schemas.openxmlformats.org/presentationml/2006/main">
+  <p:cSld>
+    <p:spTree>
+      <p:nvGrpSpPr>
+        <p:cNvPr id="1" name=""/>
+        <p:cNvGrpSpPr/>
+        <p:nvPr/>
+      </p:nvGrpSpPr>
+      <p:grpSpPr>
+        <a:xfrm>
+          <a:off x="0" y="0"/>
+          <a:ext cx="0" cy="0"/>
+          <a:chOff x="0" y="0"/>
+          <a:chExt cx="0" cy="0"/>
+        </a:xfrm>
+      </p:grpSpPr>
+      <p:sp>
+        <p:nvSpPr>
+          <p:cNvPr id="2" name="標題 1"/>
+          <p:cNvSpPr>
+            <a:spLocks noGrp="1"/>
+          </p:cNvSpPr>
+          <p:nvPr>
+            <p:ph type="title"/>
+          </p:nvPr>
+        </p:nvSpPr>
+        <p:spPr>
+          <a:xfrm>
+            <a:off x="446650" y="173501"/>
+            <a:ext cx="608427" cy="3681047"/>
+          </a:xfrm>
+        </p:spPr>
+        <p:txBody>
+          <a:bodyPr/>
+          <a:lstStyle/>
+          <a:p>
+            <a:r>
+              <a:rPr kumimoji="1" lang="zh-TW" altLang="en-US" dirty="0" smtClean="0"/>
+              <a:t>開發時間表</a:t>
+            </a:r>
+            <a:endParaRPr kumimoji="1" lang="zh-TW" altLang="en-US" dirty="0"/>
+          </a:p>
+        </p:txBody>
+      </p:sp>
+      <p:pic>
+        <p:nvPicPr>
+          <p:cNvPr id="5" name="內容版面配置區 4"/>
+          <p:cNvPicPr>
+            <a:picLocks noGrp="1" noChangeAspect="1"/>
+          </p:cNvPicPr>
+          <p:nvPr>
+            <p:ph idx="1"/>
+          </p:nvPr>
+        </p:nvPicPr>
+        <p:blipFill>
+          <a:blip r:embed="rId2">
+            <a:extLst>
+              <a:ext uri="{28A0092B-C50C-407E-A947-70E740481C1C}">
+                <a14:useLocalDpi xmlns:a14="http://schemas.microsoft.com/office/drawing/2010/main" val="0"/>
+              </a:ext>
+            </a:extLst>
+          </a:blip>
+          <a:stretch>
+            <a:fillRect/>
+          </a:stretch>
+        </p:blipFill>
+        <p:spPr>
+          <a:xfrm>
+            <a:off x="1632202" y="405202"/>
+            <a:ext cx="9058414" cy="6159721"/>
+          </a:xfrm>
+        </p:spPr>
+      </p:pic>
+    </p:spTree>
+    <p:extLst>
+      <p:ext uri="{BB962C8B-B14F-4D97-AF65-F5344CB8AC3E}">
+        <p14:creationId xmlns:p14="http://schemas.microsoft.com/office/powerpoint/2010/main" val="526803234"/>
       </p:ext>
     </p:extLst>
   </p:cSld>

</xml_diff>